<commit_message>
Opravena prezentace na Temesvar. Pridany informace o CNR a harmonickem kondicioneru.
</commit_message>
<xml_diff>
--- a/Temesvar2015.pptx
+++ b/Temesvar2015.pptx
@@ -7,6 +7,8 @@
   <p:sldIdLst>
     <p:sldId id="256" r:id="rId3"/>
     <p:sldId id="257" r:id="rId4"/>
+    <p:sldId id="258" r:id="rId5"/>
+    <p:sldId id="259" r:id="rId6"/>
   </p:sldIdLst>
   <p:sldSz cx="10080625" cy="7559675"/>
   <p:notesSz cx="7559675" cy="10691812"/>
@@ -1212,10 +1214,10 @@
           <a:p>
             <a:pPr algn="ctr"/>
             <a:r>
-              <a:rPr lang="en-US" sz="4400">
-                <a:latin typeface="Arial"/>
-              </a:rPr>
-              <a:t>Klikněte pro úpravu formátu textu nadpisu</a:t>
+              <a:rPr lang="cs-CZ" sz="4400">
+                <a:latin typeface="Arial"/>
+              </a:rPr>
+              <a:t>Click to edit the title text format</a:t>
             </a:r>
             <a:endParaRPr/>
           </a:p>
@@ -1249,10 +1251,10 @@
               <a:buChar char=""/>
             </a:pPr>
             <a:r>
-              <a:rPr lang="en-US" sz="3200">
-                <a:latin typeface="Arial"/>
-              </a:rPr>
-              <a:t>Klikněte pro úpravu formátu textu osnovy</a:t>
+              <a:rPr lang="cs-CZ" sz="3200">
+                <a:latin typeface="Arial"/>
+              </a:rPr>
+              <a:t>Click to edit the outline text format</a:t>
             </a:r>
             <a:endParaRPr/>
           </a:p>
@@ -1263,10 +1265,10 @@
               <a:buChar char=""/>
             </a:pPr>
             <a:r>
-              <a:rPr lang="en-US" sz="2800">
-                <a:latin typeface="Arial"/>
-              </a:rPr>
-              <a:t>Druhá úroveň</a:t>
+              <a:rPr lang="cs-CZ" sz="2800">
+                <a:latin typeface="Arial"/>
+              </a:rPr>
+              <a:t>Second Outline Level</a:t>
             </a:r>
             <a:endParaRPr/>
           </a:p>
@@ -1277,10 +1279,10 @@
               <a:buChar char=""/>
             </a:pPr>
             <a:r>
-              <a:rPr lang="en-US" sz="2400">
-                <a:latin typeface="Arial"/>
-              </a:rPr>
-              <a:t>Třetí úroveň</a:t>
+              <a:rPr lang="cs-CZ" sz="2400">
+                <a:latin typeface="Arial"/>
+              </a:rPr>
+              <a:t>Third Outline Level</a:t>
             </a:r>
             <a:endParaRPr/>
           </a:p>
@@ -1291,10 +1293,10 @@
               <a:buChar char=""/>
             </a:pPr>
             <a:r>
-              <a:rPr lang="en-US" sz="2000">
-                <a:latin typeface="Arial"/>
-              </a:rPr>
-              <a:t>Čtvrtá úroveň osnovy</a:t>
+              <a:rPr lang="cs-CZ" sz="2000">
+                <a:latin typeface="Arial"/>
+              </a:rPr>
+              <a:t>Fourth Outline Level</a:t>
             </a:r>
             <a:endParaRPr/>
           </a:p>
@@ -1305,10 +1307,10 @@
               <a:buChar char=""/>
             </a:pPr>
             <a:r>
-              <a:rPr lang="en-US" sz="2000">
-                <a:latin typeface="Arial"/>
-              </a:rPr>
-              <a:t>Pátá úroveň osnovy</a:t>
+              <a:rPr lang="cs-CZ" sz="2000">
+                <a:latin typeface="Arial"/>
+              </a:rPr>
+              <a:t>Fifth Outline Level</a:t>
             </a:r>
             <a:endParaRPr/>
           </a:p>
@@ -1319,10 +1321,10 @@
               <a:buChar char=""/>
             </a:pPr>
             <a:r>
-              <a:rPr lang="en-US" sz="2000">
-                <a:latin typeface="Arial"/>
-              </a:rPr>
-              <a:t>Šestá úroveň</a:t>
+              <a:rPr lang="cs-CZ" sz="2000">
+                <a:latin typeface="Arial"/>
+              </a:rPr>
+              <a:t>Sixth Outline Level</a:t>
             </a:r>
             <a:endParaRPr/>
           </a:p>
@@ -1333,10 +1335,10 @@
               <a:buChar char=""/>
             </a:pPr>
             <a:r>
-              <a:rPr lang="en-US" sz="2000">
-                <a:latin typeface="Arial"/>
-              </a:rPr>
-              <a:t>Sedmá úroveň</a:t>
+              <a:rPr lang="cs-CZ" sz="2000">
+                <a:latin typeface="Arial"/>
+              </a:rPr>
+              <a:t>Seventh Outline Level</a:t>
             </a:r>
             <a:endParaRPr/>
           </a:p>
@@ -1365,10 +1367,10 @@
           <a:bodyPr lIns="0" rIns="0" tIns="0" bIns="0"/>
           <a:p>
             <a:r>
-              <a:rPr lang="en-US" sz="1400">
+              <a:rPr lang="cs-CZ" sz="1400">
                 <a:latin typeface="Times New Roman"/>
               </a:rPr>
-              <a:t>&lt;datum/čas&gt;</a:t>
+              <a:t>&lt;date/time&gt;</a:t>
             </a:r>
             <a:endParaRPr/>
           </a:p>
@@ -1398,10 +1400,10 @@
           <a:p>
             <a:pPr algn="ctr"/>
             <a:r>
-              <a:rPr lang="en-US" sz="1400">
+              <a:rPr lang="cs-CZ" sz="1400">
                 <a:latin typeface="Times New Roman"/>
               </a:rPr>
-              <a:t>&lt;zápatí&gt;</a:t>
+              <a:t>&lt;footer&gt;</a:t>
             </a:r>
             <a:endParaRPr/>
           </a:p>
@@ -1430,11 +1432,11 @@
           <a:bodyPr lIns="0" rIns="0" tIns="0" bIns="0"/>
           <a:p>
             <a:pPr algn="r"/>
-            <a:fld id="{7880DFC3-8A80-4235-BF39-6C3166C89468}" type="slidenum">
-              <a:rPr lang="en-US" sz="1400">
+            <a:fld id="{3EAA5262-DBB5-4B5D-A836-5CC8080C2CF7}" type="slidenum">
+              <a:rPr lang="cs-CZ" sz="1400">
                 <a:latin typeface="Times New Roman"/>
               </a:rPr>
-              <a:t>&lt;číslo&gt;</a:t>
+              <a:t>&lt;number&gt;</a:t>
             </a:fld>
             <a:endParaRPr/>
           </a:p>
@@ -1497,7 +1499,7 @@
           <a:p>
             <a:pPr algn="ctr"/>
             <a:r>
-              <a:rPr lang="en-US" sz="3200">
+              <a:rPr lang="cs-CZ" sz="3200">
                 <a:latin typeface="Arial"/>
               </a:rPr>
               <a:t>Temešvár 2015</a:t>
@@ -1507,10 +1509,10 @@
           <a:p>
             <a:pPr algn="ctr"/>
             <a:r>
-              <a:rPr lang="en-US" sz="3200">
-                <a:latin typeface="Arial"/>
-              </a:rPr>
-              <a:t>Team presentation</a:t>
+              <a:rPr lang="cs-CZ" sz="3200">
+                <a:latin typeface="Arial"/>
+              </a:rPr>
+              <a:t>Prezentace týmů</a:t>
             </a:r>
             <a:endParaRPr/>
           </a:p>
@@ -1558,16 +1560,10 @@
           <a:p>
             <a:pPr algn="ctr"/>
             <a:r>
-              <a:rPr lang="en-US" sz="4400">
-                <a:latin typeface="Arial"/>
-              </a:rPr>
-              <a:t>Lighting</a:t>
-            </a:r>
-            <a:r>
-              <a:rPr lang="en-US" sz="4400">
-                <a:latin typeface="Arial"/>
-              </a:rPr>
-              <a:t> design by GA</a:t>
+              <a:rPr lang="cs-CZ" sz="4400">
+                <a:latin typeface="Arial"/>
+              </a:rPr>
+              <a:t>Návrh osvětlení pomocí GA</a:t>
             </a:r>
             <a:endParaRPr/>
           </a:p>
@@ -1597,10 +1593,10 @@
               <a:buChar char=""/>
             </a:pPr>
             <a:r>
-              <a:rPr lang="en-US" sz="3200">
-                <a:latin typeface="Arial"/>
-              </a:rPr>
-              <a:t>Cooperation with K13115</a:t>
+              <a:rPr b="1" lang="cs-CZ" sz="3200">
+                <a:latin typeface="Arial"/>
+              </a:rPr>
+              <a:t>Kooperace s K13115</a:t>
             </a:r>
             <a:endParaRPr/>
           </a:p>
@@ -1667,10 +1663,10 @@
               <a:buChar char=""/>
             </a:pPr>
             <a:r>
-              <a:rPr lang="en-US" sz="3200">
-                <a:latin typeface="Arial"/>
-              </a:rPr>
-              <a:t>Conference:</a:t>
+              <a:rPr b="1" lang="en-US" sz="3200">
+                <a:latin typeface="Arial"/>
+              </a:rPr>
+              <a:t>Konference:</a:t>
             </a:r>
             <a:endParaRPr/>
           </a:p>
@@ -1709,10 +1705,10 @@
               <a:buChar char=""/>
             </a:pPr>
             <a:r>
-              <a:rPr lang="en-US" sz="3200">
-                <a:latin typeface="Arial"/>
-              </a:rPr>
-              <a:t>Magazines:</a:t>
+              <a:rPr b="1" lang="en-US" sz="3200">
+                <a:latin typeface="Arial"/>
+              </a:rPr>
+              <a:t>Časopisy:</a:t>
             </a:r>
             <a:endParaRPr/>
           </a:p>
@@ -1748,6 +1744,430 @@
           <a:xfrm>
             <a:off x="3304800" y="2088000"/>
             <a:ext cx="6631200" cy="3420000"/>
+          </a:xfrm>
+          <a:prstGeom prst="rect">
+            <a:avLst/>
+          </a:prstGeom>
+          <a:ln>
+            <a:noFill/>
+          </a:ln>
+        </p:spPr>
+      </p:pic>
+    </p:spTree>
+  </p:cSld>
+</p:sld>
+</file>
+
+<file path=ppt/slides/slide3.xml><?xml version="1.0" encoding="utf-8"?>
+<p:sld xmlns:a="http://schemas.openxmlformats.org/drawingml/2006/main" xmlns:p="http://schemas.openxmlformats.org/presentationml/2006/main" xmlns:r="http://schemas.openxmlformats.org/officeDocument/2006/relationships">
+  <p:cSld>
+    <p:spTree>
+      <p:nvGrpSpPr>
+        <p:cNvPr id="1" name=""/>
+        <p:cNvGrpSpPr/>
+        <p:nvPr/>
+      </p:nvGrpSpPr>
+      <p:grpSpPr>
+        <a:xfrm>
+          <a:off x="0" y="0"/>
+          <a:ext cx="0" cy="0"/>
+          <a:chOff x="0" y="0"/>
+          <a:chExt cx="0" cy="0"/>
+        </a:xfrm>
+      </p:grpSpPr>
+      <p:sp>
+        <p:nvSpPr>
+          <p:cNvPr id="43" name="TextShape 1"/>
+          <p:cNvSpPr txBox="1"/>
+          <p:nvPr/>
+        </p:nvSpPr>
+        <p:spPr>
+          <a:xfrm>
+            <a:off x="504000" y="301320"/>
+            <a:ext cx="9071640" cy="1262160"/>
+          </a:xfrm>
+          <a:prstGeom prst="rect">
+            <a:avLst/>
+          </a:prstGeom>
+        </p:spPr>
+        <p:txBody>
+          <a:bodyPr lIns="0" rIns="0" tIns="0" bIns="0" anchor="ctr"/>
+          <a:p>
+            <a:pPr algn="ctr"/>
+            <a:r>
+              <a:rPr lang="cs-CZ" sz="4400">
+                <a:latin typeface="Arial"/>
+              </a:rPr>
+              <a:t>CNR Czech</a:t>
+            </a:r>
+            <a:endParaRPr/>
+          </a:p>
+        </p:txBody>
+      </p:sp>
+      <p:sp>
+        <p:nvSpPr>
+          <p:cNvPr id="44" name="TextShape 2"/>
+          <p:cNvSpPr txBox="1"/>
+          <p:nvPr/>
+        </p:nvSpPr>
+        <p:spPr>
+          <a:xfrm>
+            <a:off x="504000" y="1769040"/>
+            <a:ext cx="4426920" cy="4384440"/>
+          </a:xfrm>
+          <a:prstGeom prst="rect">
+            <a:avLst/>
+          </a:prstGeom>
+        </p:spPr>
+        <p:txBody>
+          <a:bodyPr lIns="0" rIns="0" tIns="0" bIns="0"/>
+          <a:p>
+            <a:pPr>
+              <a:buSzPct val="45000"/>
+              <a:buFont typeface="StarSymbol"/>
+              <a:buChar char=""/>
+            </a:pPr>
+            <a:r>
+              <a:rPr lang="cs-CZ" sz="3200">
+                <a:latin typeface="Arial"/>
+              </a:rPr>
+              <a:t>Spolupráce s Čínou</a:t>
+            </a:r>
+            <a:endParaRPr/>
+          </a:p>
+          <a:p>
+            <a:pPr>
+              <a:buSzPct val="45000"/>
+              <a:buFont typeface="StarSymbol"/>
+              <a:buChar char=""/>
+            </a:pPr>
+            <a:r>
+              <a:rPr lang="cs-CZ" sz="3200">
+                <a:latin typeface="Arial"/>
+              </a:rPr>
+              <a:t>Vývoj systémů pro železniční dopravu</a:t>
+            </a:r>
+            <a:endParaRPr/>
+          </a:p>
+          <a:p>
+            <a:pPr>
+              <a:buSzPct val="45000"/>
+              <a:buFont typeface="StarSymbol"/>
+              <a:buChar char=""/>
+            </a:pPr>
+            <a:r>
+              <a:rPr lang="cs-CZ" sz="3200">
+                <a:latin typeface="Arial"/>
+              </a:rPr>
+              <a:t>Většina členů týmu pochází z K13114</a:t>
+            </a:r>
+            <a:endParaRPr/>
+          </a:p>
+          <a:p>
+            <a:pPr>
+              <a:buSzPct val="45000"/>
+              <a:buFont typeface="StarSymbol"/>
+              <a:buChar char=""/>
+            </a:pPr>
+            <a:r>
+              <a:rPr lang="cs-CZ" sz="3200">
+                <a:latin typeface="Arial"/>
+              </a:rPr>
+              <a:t>Lidé z K13113</a:t>
+            </a:r>
+            <a:endParaRPr/>
+          </a:p>
+          <a:p>
+            <a:pPr lvl="1">
+              <a:buSzPct val="75000"/>
+              <a:buFont typeface="StarSymbol"/>
+              <a:buChar char=""/>
+            </a:pPr>
+            <a:r>
+              <a:rPr lang="cs-CZ" sz="2800">
+                <a:latin typeface="Arial"/>
+              </a:rPr>
+              <a:t>Karel K</a:t>
+            </a:r>
+            <a:r>
+              <a:rPr lang="cs-CZ" sz="2800">
+                <a:latin typeface="Arial"/>
+                <a:ea typeface="Arial"/>
+              </a:rPr>
+              <a:t>ü</a:t>
+            </a:r>
+            <a:r>
+              <a:rPr lang="cs-CZ" sz="2800">
+                <a:latin typeface="Arial"/>
+              </a:rPr>
+              <a:t>nzel</a:t>
+            </a:r>
+            <a:endParaRPr/>
+          </a:p>
+          <a:p>
+            <a:pPr lvl="1">
+              <a:buSzPct val="75000"/>
+              <a:buFont typeface="StarSymbol"/>
+              <a:buChar char=""/>
+            </a:pPr>
+            <a:r>
+              <a:rPr lang="cs-CZ" sz="2800">
+                <a:latin typeface="Arial"/>
+              </a:rPr>
+              <a:t>Michal Brejcha</a:t>
+            </a:r>
+            <a:endParaRPr/>
+          </a:p>
+          <a:p>
+            <a:pPr>
+              <a:buSzPct val="45000"/>
+              <a:buFont typeface="StarSymbol"/>
+              <a:buChar char=""/>
+            </a:pPr>
+            <a:r>
+              <a:rPr lang="cs-CZ" sz="3200">
+                <a:latin typeface="Arial"/>
+              </a:rPr>
+              <a:t>Konference:</a:t>
+            </a:r>
+            <a:endParaRPr/>
+          </a:p>
+          <a:p>
+            <a:pPr lvl="1">
+              <a:buSzPct val="75000"/>
+              <a:buFont typeface="StarSymbol"/>
+              <a:buChar char=""/>
+            </a:pPr>
+            <a:r>
+              <a:rPr lang="cs-CZ" sz="2800">
+                <a:latin typeface="Arial"/>
+              </a:rPr>
+              <a:t>Výsledky nelze publikovat</a:t>
+            </a:r>
+            <a:endParaRPr/>
+          </a:p>
+          <a:p>
+            <a:pPr>
+              <a:buSzPct val="45000"/>
+              <a:buFont typeface="StarSymbol"/>
+              <a:buChar char=""/>
+            </a:pPr>
+            <a:r>
+              <a:rPr lang="cs-CZ" sz="3200">
+                <a:latin typeface="Arial"/>
+              </a:rPr>
+              <a:t>Časopisy:</a:t>
+            </a:r>
+            <a:endParaRPr/>
+          </a:p>
+          <a:p>
+            <a:pPr lvl="1">
+              <a:buSzPct val="75000"/>
+              <a:buFont typeface="StarSymbol"/>
+              <a:buChar char=""/>
+            </a:pPr>
+            <a:r>
+              <a:rPr lang="cs-CZ" sz="2800">
+                <a:latin typeface="Arial"/>
+              </a:rPr>
+              <a:t>Výsledky nelze publikovat</a:t>
+            </a:r>
+            <a:endParaRPr/>
+          </a:p>
+        </p:txBody>
+      </p:sp>
+      <p:pic>
+        <p:nvPicPr>
+          <p:cNvPr id="45" name="" descr=""/>
+          <p:cNvPicPr/>
+          <p:nvPr/>
+        </p:nvPicPr>
+        <p:blipFill>
+          <a:blip r:embed="rId1"/>
+          <a:stretch>
+            <a:fillRect/>
+          </a:stretch>
+        </p:blipFill>
+        <p:spPr>
+          <a:xfrm>
+            <a:off x="5152320" y="3384000"/>
+            <a:ext cx="4426920" cy="1186560"/>
+          </a:xfrm>
+          <a:prstGeom prst="rect">
+            <a:avLst/>
+          </a:prstGeom>
+          <a:ln>
+            <a:noFill/>
+          </a:ln>
+        </p:spPr>
+      </p:pic>
+      <p:pic>
+        <p:nvPicPr>
+          <p:cNvPr id="46" name="" descr=""/>
+          <p:cNvPicPr/>
+          <p:nvPr/>
+        </p:nvPicPr>
+        <p:blipFill>
+          <a:blip r:embed="rId2"/>
+          <a:stretch>
+            <a:fillRect/>
+          </a:stretch>
+        </p:blipFill>
+        <p:spPr>
+          <a:xfrm>
+            <a:off x="5152320" y="2334240"/>
+            <a:ext cx="4426920" cy="3253320"/>
+          </a:xfrm>
+          <a:prstGeom prst="rect">
+            <a:avLst/>
+          </a:prstGeom>
+          <a:ln>
+            <a:noFill/>
+          </a:ln>
+        </p:spPr>
+      </p:pic>
+    </p:spTree>
+  </p:cSld>
+</p:sld>
+</file>
+
+<file path=ppt/slides/slide4.xml><?xml version="1.0" encoding="utf-8"?>
+<p:sld xmlns:a="http://schemas.openxmlformats.org/drawingml/2006/main" xmlns:p="http://schemas.openxmlformats.org/presentationml/2006/main" xmlns:r="http://schemas.openxmlformats.org/officeDocument/2006/relationships">
+  <p:cSld>
+    <p:spTree>
+      <p:nvGrpSpPr>
+        <p:cNvPr id="1" name=""/>
+        <p:cNvGrpSpPr/>
+        <p:nvPr/>
+      </p:nvGrpSpPr>
+      <p:grpSpPr>
+        <a:xfrm>
+          <a:off x="0" y="0"/>
+          <a:ext cx="0" cy="0"/>
+          <a:chOff x="0" y="0"/>
+          <a:chExt cx="0" cy="0"/>
+        </a:xfrm>
+      </p:grpSpPr>
+      <p:sp>
+        <p:nvSpPr>
+          <p:cNvPr id="47" name="TextShape 1"/>
+          <p:cNvSpPr txBox="1"/>
+          <p:nvPr/>
+        </p:nvSpPr>
+        <p:spPr>
+          <a:xfrm>
+            <a:off x="504000" y="301320"/>
+            <a:ext cx="9071640" cy="1262160"/>
+          </a:xfrm>
+          <a:prstGeom prst="rect">
+            <a:avLst/>
+          </a:prstGeom>
+        </p:spPr>
+        <p:txBody>
+          <a:bodyPr lIns="0" rIns="0" tIns="0" bIns="0" anchor="ctr"/>
+          <a:p>
+            <a:pPr algn="ctr"/>
+            <a:r>
+              <a:rPr lang="cs-CZ" sz="4400">
+                <a:latin typeface="Arial"/>
+              </a:rPr>
+              <a:t>Projekt aktivního harmonického kondicionéru</a:t>
+            </a:r>
+            <a:endParaRPr/>
+          </a:p>
+        </p:txBody>
+      </p:sp>
+      <p:sp>
+        <p:nvSpPr>
+          <p:cNvPr id="48" name="TextShape 2"/>
+          <p:cNvSpPr txBox="1"/>
+          <p:nvPr/>
+        </p:nvSpPr>
+        <p:spPr>
+          <a:xfrm>
+            <a:off x="504000" y="1769040"/>
+            <a:ext cx="4426920" cy="4384440"/>
+          </a:xfrm>
+          <a:prstGeom prst="rect">
+            <a:avLst/>
+          </a:prstGeom>
+        </p:spPr>
+        <p:txBody>
+          <a:bodyPr lIns="0" rIns="0" tIns="0" bIns="0"/>
+          <a:p>
+            <a:pPr>
+              <a:buSzPct val="45000"/>
+              <a:buFont typeface="StarSymbol"/>
+              <a:buChar char=""/>
+            </a:pPr>
+            <a:r>
+              <a:rPr lang="cs-CZ" sz="2600">
+                <a:latin typeface="Arial"/>
+              </a:rPr>
+              <a:t>Práce zastaveny – nejsou volné pracovní kapacity</a:t>
+            </a:r>
+            <a:endParaRPr/>
+          </a:p>
+          <a:p>
+            <a:pPr>
+              <a:buSzPct val="45000"/>
+              <a:buFont typeface="StarSymbol"/>
+              <a:buChar char=""/>
+            </a:pPr>
+            <a:r>
+              <a:rPr lang="cs-CZ" sz="2600">
+                <a:latin typeface="Arial"/>
+              </a:rPr>
+              <a:t>Plánované publikace:</a:t>
+            </a:r>
+            <a:endParaRPr/>
+          </a:p>
+          <a:p>
+            <a:pPr lvl="1">
+              <a:buSzPct val="75000"/>
+              <a:buFont typeface="StarSymbol"/>
+              <a:buChar char=""/>
+            </a:pPr>
+            <a:r>
+              <a:rPr lang="cs-CZ" sz="2000">
+                <a:latin typeface="Arial"/>
+              </a:rPr>
+              <a:t>Stále nebyl publikován princip detekce sousledné složky nesymetrie</a:t>
+            </a:r>
+            <a:endParaRPr/>
+          </a:p>
+          <a:p>
+            <a:pPr lvl="1">
+              <a:buSzPct val="75000"/>
+              <a:buFont typeface="StarSymbol"/>
+              <a:buChar char=""/>
+            </a:pPr>
+            <a:r>
+              <a:rPr lang="cs-CZ" sz="2000">
+                <a:latin typeface="Arial"/>
+              </a:rPr>
+              <a:t>Práce na publikaci ustoupily projektu s GA</a:t>
+            </a:r>
+            <a:endParaRPr/>
+          </a:p>
+        </p:txBody>
+      </p:sp>
+      <p:pic>
+        <p:nvPicPr>
+          <p:cNvPr id="49" name="" descr=""/>
+          <p:cNvPicPr/>
+          <p:nvPr/>
+        </p:nvPicPr>
+        <p:blipFill>
+          <a:blip r:embed="rId1"/>
+          <a:stretch>
+            <a:fillRect/>
+          </a:stretch>
+        </p:blipFill>
+        <p:spPr>
+          <a:xfrm>
+            <a:off x="5004000" y="1872000"/>
+            <a:ext cx="4860000" cy="3636000"/>
           </a:xfrm>
           <a:prstGeom prst="rect">
             <a:avLst/>

</xml_diff>